<commit_message>
ep07 after stream changes
</commit_message>
<xml_diff>
--- a/episode7/media/slides-episode-07.pptx
+++ b/episode7/media/slides-episode-07.pptx
@@ -5447,7 +5447,7 @@
                 </a:solidFill>
                 <a:latin typeface="Consolas (Headings)"/>
               </a:rPr>
-              <a:t>Episode 06</a:t>
+              <a:t>Episode 07</a:t>
             </a:r>
             <a:endParaRPr lang="LID4096" sz="3200" dirty="0">
               <a:solidFill>
@@ -9815,13 +9815,13 @@
         </p:spPr>
         <p:txBody>
           <a:bodyPr>
-            <a:normAutofit/>
+            <a:normAutofit fontScale="90000"/>
           </a:bodyPr>
           <a:lstStyle/>
           <a:p>
             <a:r>
               <a:rPr lang="en-AU" dirty="0"/>
-              <a:t>Going Live!</a:t>
+              <a:t>Be seated in the lobby</a:t>
             </a:r>
           </a:p>
         </p:txBody>

</xml_diff>